<commit_message>
Update New Zealand Tourism Presentation_Technical.pptx
</commit_message>
<xml_diff>
--- a/Proposal and Reports/New Zealand Tourism Presentation_Technical.pptx
+++ b/Proposal and Reports/New Zealand Tourism Presentation_Technical.pptx
@@ -6352,7 +6352,7 @@
           <a:p>
             <a:r>
               <a:rPr lang="en-US" dirty="0"/>
-              <a:t>Data is relatively not noisy and some models perform smoothing</a:t>
+              <a:t>Data is monthly with minimal noise and some models perform smoothing</a:t>
             </a:r>
           </a:p>
           <a:p>
@@ -8799,7 +8799,7 @@
           <a:p>
             <a:r>
               <a:rPr lang="en-US" dirty="0"/>
-              <a:t>Regions chosen for their parallels with airports</a:t>
+              <a:t>Regions chosen for their parallels with airports and data consistency</a:t>
             </a:r>
           </a:p>
           <a:p>

</xml_diff>